<commit_message>
chg: Correction in tgt folders
</commit_message>
<xml_diff>
--- a/INTEL/Target Folders/SRN/SRNTGT058 R-21 Highway Bridge E105.pptx
+++ b/INTEL/Target Folders/SRN/SRNTGT058 R-21 Highway Bridge E105.pptx
@@ -109,7 +109,7 @@
   </p:defaultTextStyle>
   <p:extLst>
     <p:ext uri="{EFAFB233-063F-42B5-8137-9DF3F51BA10A}">
-      <p15:sldGuideLst xmlns:p15="http://schemas.microsoft.com/office/powerpoint/2012/main">
+      <p15:sldGuideLst xmlns:p15="http://schemas.microsoft.com/office/powerpoint/2012/main" xmlns="">
         <p15:guide id="1" orient="horz" pos="1620">
           <p15:clr>
             <a:srgbClr val="A4A3A4"/>
@@ -209,7 +209,7 @@
             <a:fld id="{40637A30-8EE1-4060-9976-8832FC89EE34}" type="datetimeFigureOut">
               <a:rPr lang="nb-NO" smtClean="0"/>
               <a:pPr/>
-              <a:t>18.01.2025</a:t>
+              <a:t>18.03.2025</a:t>
             </a:fld>
             <a:endParaRPr lang="nb-NO"/>
           </a:p>
@@ -3799,7 +3799,7 @@
           <p:cNvPr id="8" name="Kép 7">
             <a:extLst>
               <a:ext uri="{FF2B5EF4-FFF2-40B4-BE49-F238E27FC236}">
-                <a16:creationId xmlns:a16="http://schemas.microsoft.com/office/drawing/2014/main" id="{7A0C9DF6-B3B3-3D84-2B63-F5B2F0E0707A}"/>
+                <a16:creationId xmlns:a16="http://schemas.microsoft.com/office/drawing/2014/main" xmlns="" id="{7A0C9DF6-B3B3-3D84-2B63-F5B2F0E0707A}"/>
               </a:ext>
             </a:extLst>
           </p:cNvPr>
@@ -3819,7 +3819,7 @@
             </a:duotone>
             <a:extLst>
               <a:ext uri="{BEBA8EAE-BF5A-486C-A8C5-ECC9F3942E4B}">
-                <a14:imgProps xmlns:a14="http://schemas.microsoft.com/office/drawing/2010/main">
+                <a14:imgProps xmlns:a14="http://schemas.microsoft.com/office/drawing/2010/main" xmlns="">
                   <a14:imgLayer r:embed="rId3">
                     <a14:imgEffect>
                       <a14:brightnessContrast bright="-20000" contrast="20000"/>
@@ -3828,7 +3828,7 @@
                 </a14:imgProps>
               </a:ext>
               <a:ext uri="{28A0092B-C50C-407E-A947-70E740481C1C}">
-                <a14:useLocalDpi xmlns:a14="http://schemas.microsoft.com/office/drawing/2010/main" val="0"/>
+                <a14:useLocalDpi xmlns:a14="http://schemas.microsoft.com/office/drawing/2010/main" xmlns="" val="0"/>
               </a:ext>
             </a:extLst>
           </a:blip>
@@ -3851,7 +3851,7 @@
           <p:cNvPr id="28" name="Kép 27">
             <a:extLst>
               <a:ext uri="{FF2B5EF4-FFF2-40B4-BE49-F238E27FC236}">
-                <a16:creationId xmlns:a16="http://schemas.microsoft.com/office/drawing/2014/main" id="{B4B9A08F-DAC1-BB52-5D76-5BE461FAF252}"/>
+                <a16:creationId xmlns:a16="http://schemas.microsoft.com/office/drawing/2014/main" xmlns="" id="{B4B9A08F-DAC1-BB52-5D76-5BE461FAF252}"/>
               </a:ext>
             </a:extLst>
           </p:cNvPr>
@@ -4154,7 +4154,7 @@
           <p:cNvPr id="21" name="Prostokąt 33">
             <a:extLst>
               <a:ext uri="{FF2B5EF4-FFF2-40B4-BE49-F238E27FC236}">
-                <a16:creationId xmlns:a16="http://schemas.microsoft.com/office/drawing/2014/main" id="{E49849C0-5340-FFB1-A5AC-D1BDAE90C0E4}"/>
+                <a16:creationId xmlns:a16="http://schemas.microsoft.com/office/drawing/2014/main" xmlns="" id="{E49849C0-5340-FFB1-A5AC-D1BDAE90C0E4}"/>
               </a:ext>
             </a:extLst>
           </p:cNvPr>
@@ -4293,7 +4293,7 @@
           <p:cNvPr id="33" name="Prostokąt 36">
             <a:extLst>
               <a:ext uri="{FF2B5EF4-FFF2-40B4-BE49-F238E27FC236}">
-                <a16:creationId xmlns:a16="http://schemas.microsoft.com/office/drawing/2014/main" id="{436C7B94-5D55-3D78-833F-99BA8488EC5C}"/>
+                <a16:creationId xmlns:a16="http://schemas.microsoft.com/office/drawing/2014/main" xmlns="" id="{436C7B94-5D55-3D78-833F-99BA8488EC5C}"/>
               </a:ext>
             </a:extLst>
           </p:cNvPr>
@@ -4382,7 +4382,7 @@
           <p:cNvPr id="39" name="Háromszög 38">
             <a:extLst>
               <a:ext uri="{FF2B5EF4-FFF2-40B4-BE49-F238E27FC236}">
-                <a16:creationId xmlns:a16="http://schemas.microsoft.com/office/drawing/2014/main" id="{599FE571-AEAA-6E24-C9CB-1CDF64FC0761}"/>
+                <a16:creationId xmlns:a16="http://schemas.microsoft.com/office/drawing/2014/main" xmlns="" id="{599FE571-AEAA-6E24-C9CB-1CDF64FC0761}"/>
               </a:ext>
             </a:extLst>
           </p:cNvPr>
@@ -4434,7 +4434,7 @@
           <p:cNvPr id="4" name="Kép 3">
             <a:extLst>
               <a:ext uri="{FF2B5EF4-FFF2-40B4-BE49-F238E27FC236}">
-                <a16:creationId xmlns:a16="http://schemas.microsoft.com/office/drawing/2014/main" id="{2582332E-BE2D-6281-C5B6-D4E7E034C860}"/>
+                <a16:creationId xmlns:a16="http://schemas.microsoft.com/office/drawing/2014/main" xmlns="" id="{2582332E-BE2D-6281-C5B6-D4E7E034C860}"/>
               </a:ext>
             </a:extLst>
           </p:cNvPr>
@@ -4447,7 +4447,7 @@
           <a:blip r:embed="rId5" cstate="print">
             <a:extLst>
               <a:ext uri="{28A0092B-C50C-407E-A947-70E740481C1C}">
-                <a14:useLocalDpi xmlns:a14="http://schemas.microsoft.com/office/drawing/2010/main" val="0"/>
+                <a14:useLocalDpi xmlns:a14="http://schemas.microsoft.com/office/drawing/2010/main" xmlns="" val="0"/>
               </a:ext>
             </a:extLst>
           </a:blip>
@@ -4470,7 +4470,7 @@
           <p:cNvPr id="6" name="Kép 5">
             <a:extLst>
               <a:ext uri="{FF2B5EF4-FFF2-40B4-BE49-F238E27FC236}">
-                <a16:creationId xmlns:a16="http://schemas.microsoft.com/office/drawing/2014/main" id="{8F557E24-D936-7AF1-2207-47EEDE09D66A}"/>
+                <a16:creationId xmlns:a16="http://schemas.microsoft.com/office/drawing/2014/main" xmlns="" id="{8F557E24-D936-7AF1-2207-47EEDE09D66A}"/>
               </a:ext>
             </a:extLst>
           </p:cNvPr>
@@ -4483,7 +4483,7 @@
           <a:blip r:embed="rId6" cstate="print">
             <a:extLst>
               <a:ext uri="{28A0092B-C50C-407E-A947-70E740481C1C}">
-                <a14:useLocalDpi xmlns:a14="http://schemas.microsoft.com/office/drawing/2010/main" val="0"/>
+                <a14:useLocalDpi xmlns:a14="http://schemas.microsoft.com/office/drawing/2010/main" xmlns="" val="0"/>
               </a:ext>
             </a:extLst>
           </a:blip>

</xml_diff>